<commit_message>
Kerran 8 diat ja tehtävät
</commit_message>
<xml_diff>
--- a/Koodauksesta.pptx
+++ b/Koodauksesta.pptx
@@ -18,6 +18,8 @@
     <p:sldId id="268" r:id="rId15"/>
     <p:sldId id="269" r:id="rId16"/>
     <p:sldId id="270" r:id="rId17"/>
+    <p:sldId id="271" r:id="rId18"/>
+    <p:sldId id="272" r:id="rId19"/>
   </p:sldIdLst>
   <p:sldSz cx="12192000" cy="6858000"/>
   <p:notesSz cx="6858000" cy="9144000"/>
@@ -362,7 +364,7 @@
           <a:p>
             <a:fld id="{ED291B17-9318-49DB-B28B-6E5994AE9581}" type="datetime1">
               <a:rPr lang="en-US" smtClean="0"/>
-              <a:t>11/21/2021</a:t>
+              <a:t>11/28/2021</a:t>
             </a:fld>
             <a:endParaRPr lang="en-US" dirty="0"/>
           </a:p>
@@ -565,7 +567,7 @@
           <a:p>
             <a:fld id="{2CED4963-E985-44C4-B8C4-FDD613B7C2F8}" type="datetime1">
               <a:rPr lang="en-US" smtClean="0"/>
-              <a:t>11/21/2021</a:t>
+              <a:t>11/28/2021</a:t>
             </a:fld>
             <a:endParaRPr lang="en-US" dirty="0"/>
           </a:p>
@@ -927,7 +929,7 @@
           <a:p>
             <a:fld id="{ED291B17-9318-49DB-B28B-6E5994AE9581}" type="datetime1">
               <a:rPr lang="en-US" smtClean="0"/>
-              <a:t>11/21/2021</a:t>
+              <a:t>11/28/2021</a:t>
             </a:fld>
             <a:endParaRPr lang="en-US" dirty="0"/>
           </a:p>
@@ -1125,7 +1127,7 @@
           <a:p>
             <a:fld id="{78DD82B9-B8EE-4375-B6FF-88FA6ABB15D9}" type="datetime1">
               <a:rPr lang="en-US" smtClean="0"/>
-              <a:t>11/21/2021</a:t>
+              <a:t>11/28/2021</a:t>
             </a:fld>
             <a:endParaRPr lang="en-US" dirty="0"/>
           </a:p>
@@ -1437,7 +1439,7 @@
           <a:p>
             <a:fld id="{B2497495-0637-405E-AE64-5CC7506D51F5}" type="datetime1">
               <a:rPr lang="en-US" smtClean="0"/>
-              <a:t>11/21/2021</a:t>
+              <a:t>11/28/2021</a:t>
             </a:fld>
             <a:endParaRPr lang="en-US" dirty="0"/>
           </a:p>
@@ -1690,7 +1692,7 @@
           <a:p>
             <a:fld id="{7BFFD690-9426-415D-8B65-26881E07B2D4}" type="datetime1">
               <a:rPr lang="en-US" smtClean="0"/>
-              <a:t>11/21/2021</a:t>
+              <a:t>11/28/2021</a:t>
             </a:fld>
             <a:endParaRPr lang="en-US" dirty="0"/>
           </a:p>
@@ -2112,7 +2114,7 @@
           <a:p>
             <a:fld id="{04C4989A-474C-40DE-95B9-011C28B71673}" type="datetime1">
               <a:rPr lang="en-US" smtClean="0"/>
-              <a:t>11/21/2021</a:t>
+              <a:t>11/28/2021</a:t>
             </a:fld>
             <a:endParaRPr lang="en-US" dirty="0"/>
           </a:p>
@@ -2235,7 +2237,7 @@
           <a:p>
             <a:fld id="{5DB4ED54-5B5E-4A04-93D3-5772E3CE3818}" type="datetime1">
               <a:rPr lang="en-US" smtClean="0"/>
-              <a:t>11/21/2021</a:t>
+              <a:t>11/28/2021</a:t>
             </a:fld>
             <a:endParaRPr lang="en-US" dirty="0"/>
           </a:p>
@@ -2330,7 +2332,7 @@
           <a:p>
             <a:fld id="{4EDE50D6-574B-40AF-946F-D52A04ADE379}" type="datetime1">
               <a:rPr lang="en-US" smtClean="0"/>
-              <a:t>11/21/2021</a:t>
+              <a:t>11/28/2021</a:t>
             </a:fld>
             <a:endParaRPr lang="en-US" dirty="0"/>
           </a:p>
@@ -2707,7 +2709,7 @@
           <a:p>
             <a:fld id="{D82884F1-FFEA-405F-9602-3DCA865EDA4E}" type="datetime1">
               <a:rPr lang="en-US" smtClean="0"/>
-              <a:t>11/21/2021</a:t>
+              <a:t>11/28/2021</a:t>
             </a:fld>
             <a:endParaRPr lang="en-US" dirty="0"/>
           </a:p>
@@ -3000,7 +3002,7 @@
           <a:p>
             <a:fld id="{7E18DB4A-8810-4A10-AD5C-D5E2C667F5B3}" type="datetime1">
               <a:rPr lang="en-US" smtClean="0"/>
-              <a:t>11/21/2021</a:t>
+              <a:t>11/28/2021</a:t>
             </a:fld>
             <a:endParaRPr lang="en-US" dirty="0"/>
           </a:p>
@@ -3215,7 +3217,7 @@
           <a:p>
             <a:fld id="{ED291B17-9318-49DB-B28B-6E5994AE9581}" type="datetime1">
               <a:rPr lang="en-US" smtClean="0"/>
-              <a:t>11/21/2021</a:t>
+              <a:t>11/28/2021</a:t>
             </a:fld>
             <a:endParaRPr lang="en-US" dirty="0"/>
           </a:p>
@@ -5287,7 +5289,7 @@
                 </a:solidFill>
                 <a:latin typeface="Consolas" panose="020B0609020204030204" pitchFamily="49" charset="0"/>
               </a:rPr>
-              <a:t>Kerran 7 aiheet: yhdistetään tähän mennessä opittua. Tehdään tehtävät 4 ja 5. Jos saat valmiiksi, voi myös tutkia/kokeilla itsenäisesti lisätehtäviä LISÄ1 ja LISÄ2.</a:t>
+              <a:t>Kerran 7 aiheet: yhdistetään tähän mennessä opittua. Tehdään tehtävät 4 ja 5. Jos saat valmiiksi, voi myös tutkia/kokeilla itsenäisesti lisätehtävää LISÄ2 ja tehtävää 6.</a:t>
             </a:r>
           </a:p>
           <a:p>
@@ -5389,6 +5391,538 @@
     <p:extLst>
       <p:ext uri="{BB962C8B-B14F-4D97-AF65-F5344CB8AC3E}">
         <p14:creationId xmlns:p14="http://schemas.microsoft.com/office/powerpoint/2010/main" val="3360227077"/>
+      </p:ext>
+    </p:extLst>
+  </p:cSld>
+  <p:clrMapOvr>
+    <a:masterClrMapping/>
+  </p:clrMapOvr>
+</p:sld>
+</file>
+
+<file path=ppt/slides/slide14.xml><?xml version="1.0" encoding="utf-8"?>
+<p:sld xmlns:a="http://schemas.openxmlformats.org/drawingml/2006/main" xmlns:r="http://schemas.openxmlformats.org/officeDocument/2006/relationships" xmlns:p="http://schemas.openxmlformats.org/presentationml/2006/main">
+  <p:cSld>
+    <p:spTree>
+      <p:nvGrpSpPr>
+        <p:cNvPr id="1" name=""/>
+        <p:cNvGrpSpPr/>
+        <p:nvPr/>
+      </p:nvGrpSpPr>
+      <p:grpSpPr>
+        <a:xfrm>
+          <a:off x="0" y="0"/>
+          <a:ext cx="0" cy="0"/>
+          <a:chOff x="0" y="0"/>
+          <a:chExt cx="0" cy="0"/>
+        </a:xfrm>
+      </p:grpSpPr>
+      <p:sp>
+        <p:nvSpPr>
+          <p:cNvPr id="2" name="Title 1">
+            <a:extLst>
+              <a:ext uri="{FF2B5EF4-FFF2-40B4-BE49-F238E27FC236}">
+                <a16:creationId xmlns:a16="http://schemas.microsoft.com/office/drawing/2014/main" id="{0F4E9AD1-33A3-4E76-A74F-8C6BD102773F}"/>
+              </a:ext>
+            </a:extLst>
+          </p:cNvPr>
+          <p:cNvSpPr>
+            <a:spLocks noGrp="1"/>
+          </p:cNvSpPr>
+          <p:nvPr>
+            <p:ph type="title"/>
+          </p:nvPr>
+        </p:nvSpPr>
+        <p:spPr/>
+        <p:txBody>
+          <a:bodyPr/>
+          <a:lstStyle/>
+          <a:p>
+            <a:r>
+              <a:rPr lang="fi-FI" dirty="0"/>
+              <a:t>Kertaus kerrasta 7 &amp; </a:t>
+            </a:r>
+            <a:r>
+              <a:rPr lang="fi-FI" dirty="0" err="1"/>
+              <a:t>KERRAn</a:t>
+            </a:r>
+            <a:r>
+              <a:rPr lang="fi-FI" dirty="0"/>
+              <a:t> 8 aiheet</a:t>
+            </a:r>
+            <a:endParaRPr lang="en-FI" dirty="0"/>
+          </a:p>
+        </p:txBody>
+      </p:sp>
+      <p:sp>
+        <p:nvSpPr>
+          <p:cNvPr id="3" name="Content Placeholder 2">
+            <a:extLst>
+              <a:ext uri="{FF2B5EF4-FFF2-40B4-BE49-F238E27FC236}">
+                <a16:creationId xmlns:a16="http://schemas.microsoft.com/office/drawing/2014/main" id="{A917B45E-C8F8-44B3-9A38-12D08AC4A13E}"/>
+              </a:ext>
+            </a:extLst>
+          </p:cNvPr>
+          <p:cNvSpPr>
+            <a:spLocks noGrp="1"/>
+          </p:cNvSpPr>
+          <p:nvPr>
+            <p:ph idx="1"/>
+          </p:nvPr>
+        </p:nvSpPr>
+        <p:spPr/>
+        <p:txBody>
+          <a:bodyPr/>
+          <a:lstStyle/>
+          <a:p>
+            <a:pPr marL="0" indent="0">
+              <a:buNone/>
+            </a:pPr>
+            <a:r>
+              <a:rPr lang="fi-FI" dirty="0">
+                <a:solidFill>
+                  <a:schemeClr val="tx1"/>
+                </a:solidFill>
+                <a:latin typeface="Consolas" panose="020B0609020204030204" pitchFamily="49" charset="0"/>
+              </a:rPr>
+              <a:t>Kertaus: Tietyn maan tietojen hakeminen (for-silmukka, </a:t>
+            </a:r>
+            <a:r>
+              <a:rPr lang="fi-FI" dirty="0" err="1">
+                <a:solidFill>
+                  <a:schemeClr val="tx1"/>
+                </a:solidFill>
+                <a:latin typeface="Consolas" panose="020B0609020204030204" pitchFamily="49" charset="0"/>
+              </a:rPr>
+              <a:t>if</a:t>
+            </a:r>
+            <a:r>
+              <a:rPr lang="fi-FI" dirty="0">
+                <a:solidFill>
+                  <a:schemeClr val="tx1"/>
+                </a:solidFill>
+                <a:latin typeface="Consolas" panose="020B0609020204030204" pitchFamily="49" charset="0"/>
+              </a:rPr>
+              <a:t>-lause)</a:t>
+            </a:r>
+          </a:p>
+          <a:p>
+            <a:pPr marL="0" indent="0">
+              <a:buNone/>
+            </a:pPr>
+            <a:r>
+              <a:rPr lang="fi-FI" dirty="0">
+                <a:solidFill>
+                  <a:schemeClr val="tx1"/>
+                </a:solidFill>
+                <a:latin typeface="Consolas" panose="020B0609020204030204" pitchFamily="49" charset="0"/>
+              </a:rPr>
+              <a:t>Kerran 8 aiheet: Suurimman arvon etsiminen, satunnaisuus. Tehdään tehtävät 6 ja 7. Jos saat valmiiksi, voi myös tutkia/kokeilla itsenäisesti lisätehtävää LISÄ2.</a:t>
+            </a:r>
+          </a:p>
+          <a:p>
+            <a:r>
+              <a:rPr lang="fi-FI" b="0" dirty="0">
+                <a:solidFill>
+                  <a:schemeClr val="tx1"/>
+                </a:solidFill>
+                <a:effectLst/>
+                <a:latin typeface="Consolas" panose="020B0609020204030204" pitchFamily="49" charset="0"/>
+              </a:rPr>
+              <a:t>Tee tehtäviä itsenäisesti tai vieruskaverin kanssa yhdessä. Jos jäät jumiin, </a:t>
+            </a:r>
+            <a:r>
+              <a:rPr lang="fi-FI" dirty="0">
+                <a:solidFill>
+                  <a:schemeClr val="tx1"/>
+                </a:solidFill>
+                <a:latin typeface="Consolas" panose="020B0609020204030204" pitchFamily="49" charset="0"/>
+              </a:rPr>
+              <a:t>kysy apua kave</a:t>
+            </a:r>
+            <a:r>
+              <a:rPr lang="fi-FI" b="0" dirty="0">
+                <a:solidFill>
+                  <a:schemeClr val="tx1"/>
+                </a:solidFill>
+                <a:effectLst/>
+                <a:latin typeface="Consolas" panose="020B0609020204030204" pitchFamily="49" charset="0"/>
+              </a:rPr>
+              <a:t>reilta tai ohjaajilta. Kun saat tehtävän tehtyä, näytä ratkaisusi opettajalle tai jollekin, joka on jo saanut tehtävän valmiiksi (katso taululta). Merkkaa nimesi taululle tehtävän kohdalle. </a:t>
+            </a:r>
+          </a:p>
+          <a:p>
+            <a:r>
+              <a:rPr lang="fi-FI" b="0" dirty="0">
+                <a:solidFill>
+                  <a:schemeClr val="tx1"/>
+                </a:solidFill>
+                <a:effectLst/>
+                <a:latin typeface="Consolas" panose="020B0609020204030204" pitchFamily="49" charset="0"/>
+              </a:rPr>
+              <a:t>Ohjeet ja </a:t>
+            </a:r>
+            <a:r>
+              <a:rPr lang="fi-FI" dirty="0">
+                <a:solidFill>
+                  <a:schemeClr val="tx1"/>
+                </a:solidFill>
+                <a:latin typeface="Consolas" panose="020B0609020204030204" pitchFamily="49" charset="0"/>
+              </a:rPr>
+              <a:t>tehtävät</a:t>
+            </a:r>
+            <a:r>
+              <a:rPr lang="fi-FI" b="0" dirty="0">
+                <a:solidFill>
+                  <a:schemeClr val="tx1"/>
+                </a:solidFill>
+                <a:effectLst/>
+                <a:latin typeface="Consolas" panose="020B0609020204030204" pitchFamily="49" charset="0"/>
+              </a:rPr>
+              <a:t>: github.com/</a:t>
+            </a:r>
+            <a:r>
+              <a:rPr lang="fi-FI" b="0" dirty="0" err="1">
+                <a:solidFill>
+                  <a:schemeClr val="tx1"/>
+                </a:solidFill>
+                <a:effectLst/>
+                <a:latin typeface="Consolas" panose="020B0609020204030204" pitchFamily="49" charset="0"/>
+              </a:rPr>
+              <a:t>mikkokotola</a:t>
+            </a:r>
+            <a:r>
+              <a:rPr lang="fi-FI" b="0" dirty="0">
+                <a:solidFill>
+                  <a:schemeClr val="tx1"/>
+                </a:solidFill>
+                <a:effectLst/>
+                <a:latin typeface="Consolas" panose="020B0609020204030204" pitchFamily="49" charset="0"/>
+              </a:rPr>
+              <a:t>/pythonkoodaus</a:t>
+            </a:r>
+          </a:p>
+          <a:p>
+            <a:pPr marL="0" indent="0">
+              <a:buNone/>
+            </a:pPr>
+            <a:endParaRPr lang="fi-FI" dirty="0">
+              <a:solidFill>
+                <a:schemeClr val="tx1"/>
+              </a:solidFill>
+              <a:latin typeface="Consolas" panose="020B0609020204030204" pitchFamily="49" charset="0"/>
+            </a:endParaRPr>
+          </a:p>
+        </p:txBody>
+      </p:sp>
+    </p:spTree>
+    <p:extLst>
+      <p:ext uri="{BB962C8B-B14F-4D97-AF65-F5344CB8AC3E}">
+        <p14:creationId xmlns:p14="http://schemas.microsoft.com/office/powerpoint/2010/main" val="2667671198"/>
+      </p:ext>
+    </p:extLst>
+  </p:cSld>
+  <p:clrMapOvr>
+    <a:masterClrMapping/>
+  </p:clrMapOvr>
+</p:sld>
+</file>
+
+<file path=ppt/slides/slide15.xml><?xml version="1.0" encoding="utf-8"?>
+<p:sld xmlns:a="http://schemas.openxmlformats.org/drawingml/2006/main" xmlns:r="http://schemas.openxmlformats.org/officeDocument/2006/relationships" xmlns:p="http://schemas.openxmlformats.org/presentationml/2006/main">
+  <p:cSld>
+    <p:spTree>
+      <p:nvGrpSpPr>
+        <p:cNvPr id="1" name=""/>
+        <p:cNvGrpSpPr/>
+        <p:nvPr/>
+      </p:nvGrpSpPr>
+      <p:grpSpPr>
+        <a:xfrm>
+          <a:off x="0" y="0"/>
+          <a:ext cx="0" cy="0"/>
+          <a:chOff x="0" y="0"/>
+          <a:chExt cx="0" cy="0"/>
+        </a:xfrm>
+      </p:grpSpPr>
+      <p:sp>
+        <p:nvSpPr>
+          <p:cNvPr id="2" name="Title 1">
+            <a:extLst>
+              <a:ext uri="{FF2B5EF4-FFF2-40B4-BE49-F238E27FC236}">
+                <a16:creationId xmlns:a16="http://schemas.microsoft.com/office/drawing/2014/main" id="{0F4E9AD1-33A3-4E76-A74F-8C6BD102773F}"/>
+              </a:ext>
+            </a:extLst>
+          </p:cNvPr>
+          <p:cNvSpPr>
+            <a:spLocks noGrp="1"/>
+          </p:cNvSpPr>
+          <p:nvPr>
+            <p:ph type="title"/>
+          </p:nvPr>
+        </p:nvSpPr>
+        <p:spPr/>
+        <p:txBody>
+          <a:bodyPr/>
+          <a:lstStyle/>
+          <a:p>
+            <a:r>
+              <a:rPr lang="fi-FI" dirty="0"/>
+              <a:t>LOPUKSI</a:t>
+            </a:r>
+            <a:endParaRPr lang="en-FI" dirty="0"/>
+          </a:p>
+        </p:txBody>
+      </p:sp>
+      <p:sp>
+        <p:nvSpPr>
+          <p:cNvPr id="3" name="Content Placeholder 2">
+            <a:extLst>
+              <a:ext uri="{FF2B5EF4-FFF2-40B4-BE49-F238E27FC236}">
+                <a16:creationId xmlns:a16="http://schemas.microsoft.com/office/drawing/2014/main" id="{A917B45E-C8F8-44B3-9A38-12D08AC4A13E}"/>
+              </a:ext>
+            </a:extLst>
+          </p:cNvPr>
+          <p:cNvSpPr>
+            <a:spLocks noGrp="1"/>
+          </p:cNvSpPr>
+          <p:nvPr>
+            <p:ph idx="1"/>
+          </p:nvPr>
+        </p:nvSpPr>
+        <p:spPr/>
+        <p:txBody>
+          <a:bodyPr/>
+          <a:lstStyle/>
+          <a:p>
+            <a:r>
+              <a:rPr lang="fi-FI" dirty="0">
+                <a:solidFill>
+                  <a:schemeClr val="tx1"/>
+                </a:solidFill>
+                <a:latin typeface="Consolas" panose="020B0609020204030204" pitchFamily="49" charset="0"/>
+              </a:rPr>
+              <a:t>Palautekysely: </a:t>
+            </a:r>
+            <a:r>
+              <a:rPr lang="fi-FI" dirty="0">
+                <a:solidFill>
+                  <a:schemeClr val="tx1"/>
+                </a:solidFill>
+                <a:latin typeface="Consolas" panose="020B0609020204030204" pitchFamily="49" charset="0"/>
+                <a:hlinkClick r:id="rId2"/>
+              </a:rPr>
+              <a:t>https://forms.office.com/r/ThG6EgPN9R</a:t>
+            </a:r>
+            <a:endParaRPr lang="fi-FI" dirty="0">
+              <a:solidFill>
+                <a:schemeClr val="tx1"/>
+              </a:solidFill>
+              <a:latin typeface="Consolas" panose="020B0609020204030204" pitchFamily="49" charset="0"/>
+            </a:endParaRPr>
+          </a:p>
+          <a:p>
+            <a:r>
+              <a:rPr lang="fi-FI" dirty="0">
+                <a:solidFill>
+                  <a:schemeClr val="tx1"/>
+                </a:solidFill>
+                <a:latin typeface="Consolas" panose="020B0609020204030204" pitchFamily="49" charset="0"/>
+              </a:rPr>
+              <a:t>Koodauksen jatkaminen:</a:t>
+            </a:r>
+          </a:p>
+          <a:p>
+            <a:pPr lvl="1"/>
+            <a:r>
+              <a:rPr lang="fi-FI" dirty="0">
+                <a:solidFill>
+                  <a:schemeClr val="tx1"/>
+                </a:solidFill>
+                <a:latin typeface="Consolas" panose="020B0609020204030204" pitchFamily="49" charset="0"/>
+              </a:rPr>
+              <a:t>Pythonin ja Visual Studio </a:t>
+            </a:r>
+            <a:r>
+              <a:rPr lang="fi-FI" dirty="0" err="1">
+                <a:solidFill>
+                  <a:schemeClr val="tx1"/>
+                </a:solidFill>
+                <a:latin typeface="Consolas" panose="020B0609020204030204" pitchFamily="49" charset="0"/>
+              </a:rPr>
+              <a:t>Coden</a:t>
+            </a:r>
+            <a:r>
+              <a:rPr lang="fi-FI" dirty="0">
+                <a:solidFill>
+                  <a:schemeClr val="tx1"/>
+                </a:solidFill>
+                <a:latin typeface="Consolas" panose="020B0609020204030204" pitchFamily="49" charset="0"/>
+              </a:rPr>
+              <a:t> voi asentaa omalle koneelle ilmaiseksi</a:t>
+            </a:r>
+          </a:p>
+          <a:p>
+            <a:pPr lvl="2"/>
+            <a:r>
+              <a:rPr lang="fi-FI" dirty="0">
+                <a:solidFill>
+                  <a:schemeClr val="tx1"/>
+                </a:solidFill>
+                <a:latin typeface="Consolas" panose="020B0609020204030204" pitchFamily="49" charset="0"/>
+              </a:rPr>
+              <a:t>Python: </a:t>
+            </a:r>
+            <a:r>
+              <a:rPr lang="fi-FI" dirty="0">
+                <a:solidFill>
+                  <a:schemeClr val="tx1"/>
+                </a:solidFill>
+                <a:latin typeface="Consolas" panose="020B0609020204030204" pitchFamily="49" charset="0"/>
+                <a:hlinkClick r:id="rId3"/>
+              </a:rPr>
+              <a:t>https://www.python.org/downloads/</a:t>
+            </a:r>
+            <a:endParaRPr lang="fi-FI" dirty="0">
+              <a:solidFill>
+                <a:schemeClr val="tx1"/>
+              </a:solidFill>
+              <a:latin typeface="Consolas" panose="020B0609020204030204" pitchFamily="49" charset="0"/>
+            </a:endParaRPr>
+          </a:p>
+          <a:p>
+            <a:pPr lvl="2"/>
+            <a:r>
+              <a:rPr lang="fi-FI" dirty="0">
+                <a:solidFill>
+                  <a:schemeClr val="tx1"/>
+                </a:solidFill>
+                <a:latin typeface="Consolas" panose="020B0609020204030204" pitchFamily="49" charset="0"/>
+              </a:rPr>
+              <a:t>Visual Studio </a:t>
+            </a:r>
+            <a:r>
+              <a:rPr lang="fi-FI" dirty="0" err="1">
+                <a:solidFill>
+                  <a:schemeClr val="tx1"/>
+                </a:solidFill>
+                <a:latin typeface="Consolas" panose="020B0609020204030204" pitchFamily="49" charset="0"/>
+              </a:rPr>
+              <a:t>Code</a:t>
+            </a:r>
+            <a:r>
+              <a:rPr lang="fi-FI" dirty="0">
+                <a:solidFill>
+                  <a:schemeClr val="tx1"/>
+                </a:solidFill>
+                <a:latin typeface="Consolas" panose="020B0609020204030204" pitchFamily="49" charset="0"/>
+              </a:rPr>
+              <a:t>: </a:t>
+            </a:r>
+            <a:r>
+              <a:rPr lang="fi-FI" dirty="0">
+                <a:solidFill>
+                  <a:schemeClr val="tx1"/>
+                </a:solidFill>
+                <a:latin typeface="Consolas" panose="020B0609020204030204" pitchFamily="49" charset="0"/>
+                <a:hlinkClick r:id="rId4"/>
+              </a:rPr>
+              <a:t>https://code.visualstudio.com/download</a:t>
+            </a:r>
+            <a:endParaRPr lang="fi-FI" dirty="0">
+              <a:solidFill>
+                <a:schemeClr val="tx1"/>
+              </a:solidFill>
+              <a:latin typeface="Consolas" panose="020B0609020204030204" pitchFamily="49" charset="0"/>
+            </a:endParaRPr>
+          </a:p>
+          <a:p>
+            <a:pPr lvl="1"/>
+            <a:r>
+              <a:rPr lang="fi-FI" dirty="0">
+                <a:solidFill>
+                  <a:schemeClr val="tx1"/>
+                </a:solidFill>
+                <a:latin typeface="Consolas" panose="020B0609020204030204" pitchFamily="49" charset="0"/>
+              </a:rPr>
+              <a:t>Koodikerhot koululla</a:t>
+            </a:r>
+          </a:p>
+          <a:p>
+            <a:pPr lvl="1"/>
+            <a:r>
+              <a:rPr lang="fi-FI" b="0" dirty="0">
+                <a:solidFill>
+                  <a:schemeClr val="tx1"/>
+                </a:solidFill>
+                <a:effectLst/>
+                <a:latin typeface="Consolas" panose="020B0609020204030204" pitchFamily="49" charset="0"/>
+              </a:rPr>
+              <a:t>Ohjelmoinnin perusteet MOOC</a:t>
+            </a:r>
+            <a:r>
+              <a:rPr lang="fi-FI" dirty="0">
+                <a:solidFill>
+                  <a:schemeClr val="tx1"/>
+                </a:solidFill>
+                <a:latin typeface="Consolas" panose="020B0609020204030204" pitchFamily="49" charset="0"/>
+              </a:rPr>
+              <a:t> (</a:t>
+            </a:r>
+            <a:r>
+              <a:rPr lang="fi-FI" dirty="0">
+                <a:solidFill>
+                  <a:schemeClr val="tx1"/>
+                </a:solidFill>
+                <a:latin typeface="Consolas" panose="020B0609020204030204" pitchFamily="49" charset="0"/>
+                <a:hlinkClick r:id="rId5"/>
+              </a:rPr>
+              <a:t>https://ohjelmointi-21.mooc.fi/</a:t>
+            </a:r>
+            <a:r>
+              <a:rPr lang="fi-FI" dirty="0">
+                <a:solidFill>
+                  <a:schemeClr val="tx1"/>
+                </a:solidFill>
+                <a:latin typeface="Consolas" panose="020B0609020204030204" pitchFamily="49" charset="0"/>
+              </a:rPr>
+              <a:t>) – teimme jos osan kurssin ensimmäisen osan tehtävistä</a:t>
+            </a:r>
+          </a:p>
+          <a:p>
+            <a:r>
+              <a:rPr lang="fi-FI" b="0" dirty="0">
+                <a:solidFill>
+                  <a:schemeClr val="tx1"/>
+                </a:solidFill>
+                <a:effectLst/>
+                <a:latin typeface="Consolas" panose="020B0609020204030204" pitchFamily="49" charset="0"/>
+              </a:rPr>
+              <a:t>Hienoa työtä koodausjaksolla</a:t>
+            </a:r>
+            <a:r>
+              <a:rPr lang="fi-FI" dirty="0">
+                <a:solidFill>
+                  <a:schemeClr val="tx1"/>
+                </a:solidFill>
+                <a:latin typeface="Consolas" panose="020B0609020204030204" pitchFamily="49" charset="0"/>
+              </a:rPr>
+              <a:t>!</a:t>
+            </a:r>
+            <a:endParaRPr lang="fi-FI" b="0" dirty="0">
+              <a:solidFill>
+                <a:schemeClr val="tx1"/>
+              </a:solidFill>
+              <a:effectLst/>
+              <a:latin typeface="Consolas" panose="020B0609020204030204" pitchFamily="49" charset="0"/>
+            </a:endParaRPr>
+          </a:p>
+        </p:txBody>
+      </p:sp>
+    </p:spTree>
+    <p:extLst>
+      <p:ext uri="{BB962C8B-B14F-4D97-AF65-F5344CB8AC3E}">
+        <p14:creationId xmlns:p14="http://schemas.microsoft.com/office/powerpoint/2010/main" val="3088278918"/>
       </p:ext>
     </p:extLst>
   </p:cSld>

</xml_diff>